<commit_message>
The Zen of Python
</commit_message>
<xml_diff>
--- a/documentations/learning-python.pptx
+++ b/documentations/learning-python.pptx
@@ -5,7 +5,7 @@
     <p:sldMasterId id="2147483665" r:id="rId1"/>
   </p:sldMasterIdLst>
   <p:notesMasterIdLst>
-    <p:notesMasterId r:id="rId7"/>
+    <p:notesMasterId r:id="rId8"/>
   </p:notesMasterIdLst>
   <p:sldIdLst>
     <p:sldId id="256" r:id="rId2"/>
@@ -13,6 +13,7 @@
     <p:sldId id="258" r:id="rId4"/>
     <p:sldId id="259" r:id="rId5"/>
     <p:sldId id="260" r:id="rId6"/>
+    <p:sldId id="261" r:id="rId7"/>
   </p:sldIdLst>
   <p:sldSz cx="12192000" cy="6858000"/>
   <p:notesSz cx="6858000" cy="9144000"/>
@@ -796,6 +797,90 @@
     <p:extLst>
       <p:ext uri="{BB962C8B-B14F-4D97-AF65-F5344CB8AC3E}">
         <p14:creationId xmlns:p14="http://schemas.microsoft.com/office/powerpoint/2010/main" val="2834213693"/>
+      </p:ext>
+    </p:extLst>
+  </p:cSld>
+  <p:clrMapOvr>
+    <a:masterClrMapping/>
+  </p:clrMapOvr>
+</p:notes>
+</file>
+
+<file path=ppt/notesSlides/notesSlide5.xml><?xml version="1.0" encoding="utf-8"?>
+<p:notes xmlns:a="http://schemas.openxmlformats.org/drawingml/2006/main" xmlns:r="http://schemas.openxmlformats.org/officeDocument/2006/relationships" xmlns:p="http://schemas.openxmlformats.org/presentationml/2006/main">
+  <p:cSld>
+    <p:spTree>
+      <p:nvGrpSpPr>
+        <p:cNvPr id="1" name=""/>
+        <p:cNvGrpSpPr/>
+        <p:nvPr/>
+      </p:nvGrpSpPr>
+      <p:grpSpPr>
+        <a:xfrm>
+          <a:off x="0" y="0"/>
+          <a:ext cx="0" cy="0"/>
+          <a:chOff x="0" y="0"/>
+          <a:chExt cx="0" cy="0"/>
+        </a:xfrm>
+      </p:grpSpPr>
+      <p:sp>
+        <p:nvSpPr>
+          <p:cNvPr id="2" name="Espace réservé de l'image des diapositives 1"/>
+          <p:cNvSpPr>
+            <a:spLocks noGrp="1" noRot="1" noChangeAspect="1"/>
+          </p:cNvSpPr>
+          <p:nvPr>
+            <p:ph type="sldImg"/>
+          </p:nvPr>
+        </p:nvSpPr>
+        <p:spPr/>
+      </p:sp>
+      <p:sp>
+        <p:nvSpPr>
+          <p:cNvPr id="3" name="Espace réservé des commentaires 2"/>
+          <p:cNvSpPr>
+            <a:spLocks noGrp="1"/>
+          </p:cNvSpPr>
+          <p:nvPr>
+            <p:ph type="body" idx="1"/>
+          </p:nvPr>
+        </p:nvSpPr>
+        <p:spPr/>
+        <p:txBody>
+          <a:bodyPr/>
+          <a:lstStyle/>
+          <a:p>
+            <a:endParaRPr lang="fr-FR"/>
+          </a:p>
+        </p:txBody>
+      </p:sp>
+      <p:sp>
+        <p:nvSpPr>
+          <p:cNvPr id="4" name="Espace réservé du numéro de diapositive 3"/>
+          <p:cNvSpPr>
+            <a:spLocks noGrp="1"/>
+          </p:cNvSpPr>
+          <p:nvPr>
+            <p:ph type="sldNum" sz="quarter" idx="10"/>
+          </p:nvPr>
+        </p:nvSpPr>
+        <p:spPr/>
+        <p:txBody>
+          <a:bodyPr/>
+          <a:lstStyle/>
+          <a:p>
+            <a:fld id="{58BEE673-8D3B-4BBD-97EB-7004EF7CF6EF}" type="slidenum">
+              <a:rPr lang="fr-FR" smtClean="0"/>
+              <a:t>6</a:t>
+            </a:fld>
+            <a:endParaRPr lang="fr-FR"/>
+          </a:p>
+        </p:txBody>
+      </p:sp>
+    </p:spTree>
+    <p:extLst>
+      <p:ext uri="{BB962C8B-B14F-4D97-AF65-F5344CB8AC3E}">
+        <p14:creationId xmlns:p14="http://schemas.microsoft.com/office/powerpoint/2010/main" val="1051018602"/>
       </p:ext>
     </p:extLst>
   </p:cSld>
@@ -8921,11 +9006,7 @@
           <a:p>
             <a:r>
               <a:rPr lang="fr-FR" dirty="0" smtClean="0"/>
-              <a:t>Une introduction au langage </a:t>
-            </a:r>
-            <a:r>
-              <a:rPr lang="fr-FR" dirty="0" smtClean="0"/>
-              <a:t>Python</a:t>
+              <a:t>Une introduction au langage Python</a:t>
             </a:r>
             <a:endParaRPr lang="fr-FR" dirty="0"/>
           </a:p>
@@ -8959,7 +9040,6 @@
               <a:rPr lang="fr-FR" dirty="0"/>
               <a:t>n</a:t>
             </a:r>
-            <a:endParaRPr lang="fr-FR" dirty="0"/>
           </a:p>
         </p:txBody>
       </p:sp>
@@ -9238,11 +9318,7 @@
             <a:pPr algn="just"/>
             <a:r>
               <a:rPr lang="fr-FR" dirty="0" smtClean="0"/>
-              <a:t>En 2001, la "Python Software Foundatio</a:t>
-            </a:r>
-            <a:r>
-              <a:rPr lang="fr-FR" dirty="0" smtClean="0"/>
-              <a:t>n" est créée pour gérer tous les aspects de la propriété intellectuelle de Python</a:t>
+              <a:t>En 2001, la "Python Software Foundation" est créée pour gérer tous les aspects de la propriété intellectuelle de Python</a:t>
             </a:r>
             <a:endParaRPr lang="fr-FR" dirty="0"/>
           </a:p>
@@ -9522,7 +9598,6 @@
               <a:rPr lang="fr-FR" dirty="0"/>
               <a:t>est également adapté comme langage d’extension pour personnaliser des applications.</a:t>
             </a:r>
-            <a:endParaRPr lang="fr-FR" dirty="0"/>
           </a:p>
         </p:txBody>
       </p:sp>
@@ -9530,6 +9605,513 @@
     <p:extLst>
       <p:ext uri="{BB962C8B-B14F-4D97-AF65-F5344CB8AC3E}">
         <p14:creationId xmlns:p14="http://schemas.microsoft.com/office/powerpoint/2010/main" val="1554236543"/>
+      </p:ext>
+    </p:extLst>
+  </p:cSld>
+  <p:clrMapOvr>
+    <a:masterClrMapping/>
+  </p:clrMapOvr>
+  <p:timing>
+    <p:tnLst>
+      <p:par>
+        <p:cTn id="1" dur="indefinite" restart="never" nodeType="tmRoot"/>
+      </p:par>
+    </p:tnLst>
+  </p:timing>
+</p:sld>
+</file>
+
+<file path=ppt/slides/slide6.xml><?xml version="1.0" encoding="utf-8"?>
+<p:sld xmlns:a="http://schemas.openxmlformats.org/drawingml/2006/main" xmlns:r="http://schemas.openxmlformats.org/officeDocument/2006/relationships" xmlns:p="http://schemas.openxmlformats.org/presentationml/2006/main">
+  <p:cSld>
+    <p:spTree>
+      <p:nvGrpSpPr>
+        <p:cNvPr id="1" name=""/>
+        <p:cNvGrpSpPr/>
+        <p:nvPr/>
+      </p:nvGrpSpPr>
+      <p:grpSpPr>
+        <a:xfrm>
+          <a:off x="0" y="0"/>
+          <a:ext cx="0" cy="0"/>
+          <a:chOff x="0" y="0"/>
+          <a:chExt cx="0" cy="0"/>
+        </a:xfrm>
+      </p:grpSpPr>
+      <p:sp>
+        <p:nvSpPr>
+          <p:cNvPr id="2" name="Titre 1"/>
+          <p:cNvSpPr>
+            <a:spLocks noGrp="1"/>
+          </p:cNvSpPr>
+          <p:nvPr>
+            <p:ph type="title"/>
+          </p:nvPr>
+        </p:nvSpPr>
+        <p:spPr>
+          <a:xfrm>
+            <a:off x="2592925" y="624110"/>
+            <a:ext cx="8911687" cy="1280890"/>
+          </a:xfrm>
+        </p:spPr>
+        <p:txBody>
+          <a:bodyPr/>
+          <a:lstStyle/>
+          <a:p>
+            <a:r>
+              <a:rPr lang="fr-FR" dirty="0" smtClean="0"/>
+              <a:t>Le "Zen" de Python (</a:t>
+            </a:r>
+            <a:r>
+              <a:rPr lang="fr-FR" b="1" i="1" dirty="0" smtClean="0">
+                <a:solidFill>
+                  <a:schemeClr val="accent6"/>
+                </a:solidFill>
+              </a:rPr>
+              <a:t>import this</a:t>
+            </a:r>
+            <a:r>
+              <a:rPr lang="fr-FR" dirty="0" smtClean="0"/>
+              <a:t>)</a:t>
+            </a:r>
+            <a:endParaRPr lang="fr-FR" dirty="0"/>
+          </a:p>
+        </p:txBody>
+      </p:sp>
+      <p:sp>
+        <p:nvSpPr>
+          <p:cNvPr id="3" name="Espace réservé du contenu 2"/>
+          <p:cNvSpPr>
+            <a:spLocks noGrp="1"/>
+          </p:cNvSpPr>
+          <p:nvPr>
+            <p:ph idx="1"/>
+          </p:nvPr>
+        </p:nvSpPr>
+        <p:spPr>
+          <a:xfrm>
+            <a:off x="879682" y="1590259"/>
+            <a:ext cx="4837306" cy="5160397"/>
+          </a:xfrm>
+        </p:spPr>
+        <p:txBody>
+          <a:bodyPr anchor="t" anchorCtr="0">
+            <a:normAutofit/>
+          </a:bodyPr>
+          <a:lstStyle/>
+          <a:p>
+            <a:r>
+              <a:rPr lang="fr-FR" sz="1600" dirty="0"/>
+              <a:t>Le beau est préférable au laid</a:t>
+            </a:r>
+            <a:r>
+              <a:rPr lang="fr-FR" sz="1600" dirty="0" smtClean="0"/>
+              <a:t>.</a:t>
+            </a:r>
+            <a:endParaRPr lang="fr-FR" sz="1600" dirty="0"/>
+          </a:p>
+          <a:p>
+            <a:r>
+              <a:rPr lang="fr-FR" sz="1600" dirty="0"/>
+              <a:t>L'explicite est préférable à l'implicite</a:t>
+            </a:r>
+            <a:r>
+              <a:rPr lang="fr-FR" sz="1600" dirty="0" smtClean="0"/>
+              <a:t>.</a:t>
+            </a:r>
+            <a:endParaRPr lang="fr-FR" sz="1600" dirty="0"/>
+          </a:p>
+          <a:p>
+            <a:r>
+              <a:rPr lang="fr-FR" sz="1600" dirty="0"/>
+              <a:t>Le simple est préférable au complexe</a:t>
+            </a:r>
+            <a:r>
+              <a:rPr lang="fr-FR" sz="1600" dirty="0" smtClean="0"/>
+              <a:t>.</a:t>
+            </a:r>
+            <a:endParaRPr lang="fr-FR" sz="1600" dirty="0"/>
+          </a:p>
+          <a:p>
+            <a:r>
+              <a:rPr lang="fr-FR" sz="1600" dirty="0"/>
+              <a:t>Le complexe est préférable au compliqué</a:t>
+            </a:r>
+            <a:r>
+              <a:rPr lang="fr-FR" sz="1600" dirty="0" smtClean="0"/>
+              <a:t>.</a:t>
+            </a:r>
+            <a:endParaRPr lang="fr-FR" sz="1600" dirty="0"/>
+          </a:p>
+          <a:p>
+            <a:r>
+              <a:rPr lang="fr-FR" sz="1600" dirty="0"/>
+              <a:t>L'horizontal est préférable à l'imbriqué</a:t>
+            </a:r>
+            <a:r>
+              <a:rPr lang="fr-FR" sz="1600" dirty="0" smtClean="0"/>
+              <a:t>.</a:t>
+            </a:r>
+            <a:endParaRPr lang="fr-FR" sz="1600" dirty="0"/>
+          </a:p>
+          <a:p>
+            <a:r>
+              <a:rPr lang="fr-FR" sz="1600" dirty="0"/>
+              <a:t>L'aéré est préférable au dense</a:t>
+            </a:r>
+            <a:r>
+              <a:rPr lang="fr-FR" sz="1600" dirty="0" smtClean="0"/>
+              <a:t>.</a:t>
+            </a:r>
+            <a:endParaRPr lang="fr-FR" sz="1600" dirty="0"/>
+          </a:p>
+          <a:p>
+            <a:r>
+              <a:rPr lang="fr-FR" sz="1600" dirty="0"/>
+              <a:t>La lisibilité compte</a:t>
+            </a:r>
+            <a:r>
+              <a:rPr lang="fr-FR" sz="1600" dirty="0" smtClean="0"/>
+              <a:t>. Les </a:t>
+            </a:r>
+            <a:r>
+              <a:rPr lang="fr-FR" sz="1600" dirty="0"/>
+              <a:t>cas spéciaux ne le sont pas assez pour transgresser les règles. </a:t>
+            </a:r>
+            <a:endParaRPr lang="fr-FR" sz="1600" dirty="0" smtClean="0"/>
+          </a:p>
+          <a:p>
+            <a:r>
+              <a:rPr lang="fr-FR" sz="1600" dirty="0" smtClean="0"/>
+              <a:t>Sauf </a:t>
+            </a:r>
+            <a:r>
+              <a:rPr lang="fr-FR" sz="1600" dirty="0"/>
+              <a:t>si le cas pratique bat le cas théorique</a:t>
+            </a:r>
+            <a:r>
+              <a:rPr lang="fr-FR" sz="1600" dirty="0" smtClean="0"/>
+              <a:t>.</a:t>
+            </a:r>
+            <a:endParaRPr lang="fr-FR" sz="1600" dirty="0"/>
+          </a:p>
+          <a:p>
+            <a:r>
+              <a:rPr lang="fr-FR" sz="1600" dirty="0"/>
+              <a:t>Les erreurs ne devraient jamais arriver silencieusement</a:t>
+            </a:r>
+            <a:r>
+              <a:rPr lang="fr-FR" sz="1600" dirty="0" smtClean="0"/>
+              <a:t>.</a:t>
+            </a:r>
+          </a:p>
+          <a:p>
+            <a:r>
+              <a:rPr lang="fr-FR" sz="1600" dirty="0"/>
+              <a:t>Sauf si on les a explicitement rendues silencieuses</a:t>
+            </a:r>
+            <a:r>
+              <a:rPr lang="fr-FR" sz="1600" dirty="0" smtClean="0"/>
+              <a:t>.</a:t>
+            </a:r>
+            <a:endParaRPr lang="fr-FR" sz="1600" dirty="0"/>
+          </a:p>
+        </p:txBody>
+      </p:sp>
+      <p:sp>
+        <p:nvSpPr>
+          <p:cNvPr id="4" name="Espace réservé du contenu 2"/>
+          <p:cNvSpPr txBox="1">
+            <a:spLocks/>
+          </p:cNvSpPr>
+          <p:nvPr/>
+        </p:nvSpPr>
+        <p:spPr>
+          <a:xfrm>
+            <a:off x="6305383" y="1590260"/>
+            <a:ext cx="5581817" cy="5160397"/>
+          </a:xfrm>
+          <a:prstGeom prst="rect">
+            <a:avLst/>
+          </a:prstGeom>
+        </p:spPr>
+        <p:txBody>
+          <a:bodyPr vert="horz" lIns="91440" tIns="45720" rIns="91440" bIns="45720" rtlCol="0" anchor="t" anchorCtr="0">
+            <a:normAutofit/>
+          </a:bodyPr>
+          <a:lstStyle>
+            <a:lvl1pPr marL="342900" indent="-342900" algn="l" defTabSz="457200" rtl="0" eaLnBrk="1" latinLnBrk="0" hangingPunct="1">
+              <a:spcBef>
+                <a:spcPts val="1000"/>
+              </a:spcBef>
+              <a:spcAft>
+                <a:spcPts val="0"/>
+              </a:spcAft>
+              <a:buClr>
+                <a:schemeClr val="accent1"/>
+              </a:buClr>
+              <a:buFont typeface="Wingdings 3" charset="2"/>
+              <a:buChar char=""/>
+              <a:defRPr sz="1800" kern="1200">
+                <a:solidFill>
+                  <a:schemeClr val="tx1">
+                    <a:lumMod val="75000"/>
+                    <a:lumOff val="25000"/>
+                  </a:schemeClr>
+                </a:solidFill>
+                <a:latin typeface="+mn-lt"/>
+                <a:ea typeface="+mn-ea"/>
+                <a:cs typeface="+mn-cs"/>
+              </a:defRPr>
+            </a:lvl1pPr>
+            <a:lvl2pPr marL="742950" indent="-285750" algn="l" defTabSz="457200" rtl="0" eaLnBrk="1" latinLnBrk="0" hangingPunct="1">
+              <a:spcBef>
+                <a:spcPts val="1000"/>
+              </a:spcBef>
+              <a:spcAft>
+                <a:spcPts val="0"/>
+              </a:spcAft>
+              <a:buClr>
+                <a:schemeClr val="accent1"/>
+              </a:buClr>
+              <a:buFont typeface="Wingdings 3" charset="2"/>
+              <a:buChar char=""/>
+              <a:defRPr sz="1600" kern="1200">
+                <a:solidFill>
+                  <a:schemeClr val="tx1">
+                    <a:lumMod val="75000"/>
+                    <a:lumOff val="25000"/>
+                  </a:schemeClr>
+                </a:solidFill>
+                <a:latin typeface="+mn-lt"/>
+                <a:ea typeface="+mn-ea"/>
+                <a:cs typeface="+mn-cs"/>
+              </a:defRPr>
+            </a:lvl2pPr>
+            <a:lvl3pPr marL="1143000" indent="-228600" algn="l" defTabSz="457200" rtl="0" eaLnBrk="1" latinLnBrk="0" hangingPunct="1">
+              <a:spcBef>
+                <a:spcPts val="1000"/>
+              </a:spcBef>
+              <a:spcAft>
+                <a:spcPts val="0"/>
+              </a:spcAft>
+              <a:buClr>
+                <a:schemeClr val="accent1"/>
+              </a:buClr>
+              <a:buFont typeface="Wingdings 3" charset="2"/>
+              <a:buChar char=""/>
+              <a:defRPr sz="1400" kern="1200">
+                <a:solidFill>
+                  <a:schemeClr val="tx1">
+                    <a:lumMod val="75000"/>
+                    <a:lumOff val="25000"/>
+                  </a:schemeClr>
+                </a:solidFill>
+                <a:latin typeface="+mn-lt"/>
+                <a:ea typeface="+mn-ea"/>
+                <a:cs typeface="+mn-cs"/>
+              </a:defRPr>
+            </a:lvl3pPr>
+            <a:lvl4pPr marL="1600200" indent="-228600" algn="l" defTabSz="457200" rtl="0" eaLnBrk="1" latinLnBrk="0" hangingPunct="1">
+              <a:spcBef>
+                <a:spcPts val="1000"/>
+              </a:spcBef>
+              <a:spcAft>
+                <a:spcPts val="0"/>
+              </a:spcAft>
+              <a:buClr>
+                <a:schemeClr val="accent1"/>
+              </a:buClr>
+              <a:buFont typeface="Wingdings 3" charset="2"/>
+              <a:buChar char=""/>
+              <a:defRPr sz="1200" kern="1200">
+                <a:solidFill>
+                  <a:schemeClr val="tx1">
+                    <a:lumMod val="75000"/>
+                    <a:lumOff val="25000"/>
+                  </a:schemeClr>
+                </a:solidFill>
+                <a:latin typeface="+mn-lt"/>
+                <a:ea typeface="+mn-ea"/>
+                <a:cs typeface="+mn-cs"/>
+              </a:defRPr>
+            </a:lvl4pPr>
+            <a:lvl5pPr marL="2057400" indent="-228600" algn="l" defTabSz="457200" rtl="0" eaLnBrk="1" latinLnBrk="0" hangingPunct="1">
+              <a:spcBef>
+                <a:spcPts val="1000"/>
+              </a:spcBef>
+              <a:spcAft>
+                <a:spcPts val="0"/>
+              </a:spcAft>
+              <a:buClr>
+                <a:schemeClr val="accent1"/>
+              </a:buClr>
+              <a:buFont typeface="Wingdings 3" charset="2"/>
+              <a:buChar char=""/>
+              <a:defRPr sz="1200" kern="1200">
+                <a:solidFill>
+                  <a:schemeClr val="tx1">
+                    <a:lumMod val="75000"/>
+                    <a:lumOff val="25000"/>
+                  </a:schemeClr>
+                </a:solidFill>
+                <a:latin typeface="+mn-lt"/>
+                <a:ea typeface="+mn-ea"/>
+                <a:cs typeface="+mn-cs"/>
+              </a:defRPr>
+            </a:lvl5pPr>
+            <a:lvl6pPr marL="2514600" indent="-228600" algn="l" defTabSz="457200" rtl="0" eaLnBrk="1" latinLnBrk="0" hangingPunct="1">
+              <a:spcBef>
+                <a:spcPts val="1000"/>
+              </a:spcBef>
+              <a:spcAft>
+                <a:spcPts val="0"/>
+              </a:spcAft>
+              <a:buClr>
+                <a:schemeClr val="accent1"/>
+              </a:buClr>
+              <a:buFont typeface="Wingdings 3" charset="2"/>
+              <a:buChar char=""/>
+              <a:defRPr sz="1200" kern="1200">
+                <a:solidFill>
+                  <a:schemeClr val="tx1">
+                    <a:lumMod val="75000"/>
+                    <a:lumOff val="25000"/>
+                  </a:schemeClr>
+                </a:solidFill>
+                <a:latin typeface="+mn-lt"/>
+                <a:ea typeface="+mn-ea"/>
+                <a:cs typeface="+mn-cs"/>
+              </a:defRPr>
+            </a:lvl6pPr>
+            <a:lvl7pPr marL="2971800" indent="-228600" algn="l" defTabSz="457200" rtl="0" eaLnBrk="1" latinLnBrk="0" hangingPunct="1">
+              <a:spcBef>
+                <a:spcPts val="1000"/>
+              </a:spcBef>
+              <a:spcAft>
+                <a:spcPts val="0"/>
+              </a:spcAft>
+              <a:buClr>
+                <a:schemeClr val="accent1"/>
+              </a:buClr>
+              <a:buFont typeface="Wingdings 3" charset="2"/>
+              <a:buChar char=""/>
+              <a:defRPr sz="1200" kern="1200">
+                <a:solidFill>
+                  <a:schemeClr val="tx1">
+                    <a:lumMod val="75000"/>
+                    <a:lumOff val="25000"/>
+                  </a:schemeClr>
+                </a:solidFill>
+                <a:latin typeface="+mn-lt"/>
+                <a:ea typeface="+mn-ea"/>
+                <a:cs typeface="+mn-cs"/>
+              </a:defRPr>
+            </a:lvl7pPr>
+            <a:lvl8pPr marL="3429000" indent="-228600" algn="l" defTabSz="457200" rtl="0" eaLnBrk="1" latinLnBrk="0" hangingPunct="1">
+              <a:spcBef>
+                <a:spcPts val="1000"/>
+              </a:spcBef>
+              <a:spcAft>
+                <a:spcPts val="0"/>
+              </a:spcAft>
+              <a:buClr>
+                <a:schemeClr val="accent1"/>
+              </a:buClr>
+              <a:buFont typeface="Wingdings 3" charset="2"/>
+              <a:buChar char=""/>
+              <a:defRPr sz="1200" kern="1200">
+                <a:solidFill>
+                  <a:schemeClr val="tx1">
+                    <a:lumMod val="75000"/>
+                    <a:lumOff val="25000"/>
+                  </a:schemeClr>
+                </a:solidFill>
+                <a:latin typeface="+mn-lt"/>
+                <a:ea typeface="+mn-ea"/>
+                <a:cs typeface="+mn-cs"/>
+              </a:defRPr>
+            </a:lvl8pPr>
+            <a:lvl9pPr marL="3886200" indent="-228600" algn="l" defTabSz="457200" rtl="0" eaLnBrk="1" latinLnBrk="0" hangingPunct="1">
+              <a:spcBef>
+                <a:spcPts val="1000"/>
+              </a:spcBef>
+              <a:spcAft>
+                <a:spcPts val="0"/>
+              </a:spcAft>
+              <a:buClr>
+                <a:schemeClr val="accent1"/>
+              </a:buClr>
+              <a:buFont typeface="Wingdings 3" charset="2"/>
+              <a:buChar char=""/>
+              <a:defRPr sz="1200" kern="1200">
+                <a:solidFill>
+                  <a:schemeClr val="tx1">
+                    <a:lumMod val="75000"/>
+                    <a:lumOff val="25000"/>
+                  </a:schemeClr>
+                </a:solidFill>
+                <a:latin typeface="+mn-lt"/>
+                <a:ea typeface="+mn-ea"/>
+                <a:cs typeface="+mn-cs"/>
+              </a:defRPr>
+            </a:lvl9pPr>
+          </a:lstStyle>
+          <a:p>
+            <a:r>
+              <a:rPr lang="fr-FR" sz="1600" dirty="0" smtClean="0"/>
+              <a:t>En cas de doute, ne tentez pas de deviner. </a:t>
+            </a:r>
+          </a:p>
+          <a:p>
+            <a:r>
+              <a:rPr lang="fr-FR" sz="1600" dirty="0" smtClean="0"/>
+              <a:t>Il devrait y avoir une, et de préférence une seule, manière évidente de le faire.</a:t>
+            </a:r>
+          </a:p>
+          <a:p>
+            <a:r>
+              <a:rPr lang="fr-FR" sz="1600" dirty="0" smtClean="0"/>
+              <a:t>Même si cette manière peut ne pas sembler évidente au premier abord sauf si vous êtes néerlandais.</a:t>
+            </a:r>
+          </a:p>
+          <a:p>
+            <a:r>
+              <a:rPr lang="fr-FR" sz="1600" dirty="0" smtClean="0"/>
+              <a:t>Ce qui est fait maintenant est préférable à ce qui ne sera jamais fait.</a:t>
+            </a:r>
+          </a:p>
+          <a:p>
+            <a:r>
+              <a:rPr lang="fr-FR" sz="1600" dirty="0" smtClean="0"/>
+              <a:t>Même si jamais est souvent mieux que tout de suite.</a:t>
+            </a:r>
+          </a:p>
+          <a:p>
+            <a:r>
+              <a:rPr lang="fr-FR" sz="1600" dirty="0" smtClean="0"/>
+              <a:t>Si l'implémentation est difficile à expliquer, c'est que c'est une mauvaise idée.</a:t>
+            </a:r>
+          </a:p>
+          <a:p>
+            <a:r>
+              <a:rPr lang="fr-FR" sz="1600" dirty="0" smtClean="0"/>
+              <a:t>Si l'implémentation est facile à expliquer, c'est que c'est peut-être une bonne idée.</a:t>
+            </a:r>
+          </a:p>
+          <a:p>
+            <a:r>
+              <a:rPr lang="fr-FR" sz="1600" dirty="0" smtClean="0"/>
+              <a:t>Les espaces de noms sont une brillante idée, créons-en plus !</a:t>
+            </a:r>
+            <a:endParaRPr lang="fr-FR" sz="1600" dirty="0"/>
+          </a:p>
+        </p:txBody>
+      </p:sp>
+    </p:spTree>
+    <p:extLst>
+      <p:ext uri="{BB962C8B-B14F-4D97-AF65-F5344CB8AC3E}">
+        <p14:creationId xmlns:p14="http://schemas.microsoft.com/office/powerpoint/2010/main" val="2063766052"/>
       </p:ext>
     </p:extLst>
   </p:cSld>

</xml_diff>